<commit_message>
chore(cmmn): extend case lifecycle example by images
related to CAM-2467
</commit_message>
<xml_diff>
--- a/develop/drawings/CaseLifeCycles.pptx
+++ b/develop/drawings/CaseLifeCycles.pptx
@@ -8,6 +8,10 @@
     <p:sldId id="260" r:id="rId2"/>
     <p:sldId id="261" r:id="rId3"/>
     <p:sldId id="262" r:id="rId4"/>
+    <p:sldId id="263" r:id="rId5"/>
+    <p:sldId id="264" r:id="rId6"/>
+    <p:sldId id="265" r:id="rId7"/>
+    <p:sldId id="266" r:id="rId8"/>
   </p:sldIdLst>
   <p:sldSz cx="9144000" cy="6858000" type="screen4x3"/>
   <p:notesSz cx="6858000" cy="9144000"/>
@@ -306,7 +310,7 @@
           <a:p>
             <a:fld id="{53456102-AF98-4902-8B3F-7190DD0573D9}" type="datetimeFigureOut">
               <a:rPr lang="de-DE" smtClean="0"/>
-              <a:t>27.11.2014</a:t>
+              <a:t>01.12.2014</a:t>
             </a:fld>
             <a:endParaRPr lang="de-DE"/>
           </a:p>
@@ -476,7 +480,7 @@
           <a:p>
             <a:fld id="{53456102-AF98-4902-8B3F-7190DD0573D9}" type="datetimeFigureOut">
               <a:rPr lang="de-DE" smtClean="0"/>
-              <a:t>27.11.2014</a:t>
+              <a:t>01.12.2014</a:t>
             </a:fld>
             <a:endParaRPr lang="de-DE"/>
           </a:p>
@@ -656,7 +660,7 @@
           <a:p>
             <a:fld id="{53456102-AF98-4902-8B3F-7190DD0573D9}" type="datetimeFigureOut">
               <a:rPr lang="de-DE" smtClean="0"/>
-              <a:t>27.11.2014</a:t>
+              <a:t>01.12.2014</a:t>
             </a:fld>
             <a:endParaRPr lang="de-DE"/>
           </a:p>
@@ -826,7 +830,7 @@
           <a:p>
             <a:fld id="{53456102-AF98-4902-8B3F-7190DD0573D9}" type="datetimeFigureOut">
               <a:rPr lang="de-DE" smtClean="0"/>
-              <a:t>27.11.2014</a:t>
+              <a:t>01.12.2014</a:t>
             </a:fld>
             <a:endParaRPr lang="de-DE"/>
           </a:p>
@@ -1072,7 +1076,7 @@
           <a:p>
             <a:fld id="{53456102-AF98-4902-8B3F-7190DD0573D9}" type="datetimeFigureOut">
               <a:rPr lang="de-DE" smtClean="0"/>
-              <a:t>27.11.2014</a:t>
+              <a:t>01.12.2014</a:t>
             </a:fld>
             <a:endParaRPr lang="de-DE"/>
           </a:p>
@@ -1360,7 +1364,7 @@
           <a:p>
             <a:fld id="{53456102-AF98-4902-8B3F-7190DD0573D9}" type="datetimeFigureOut">
               <a:rPr lang="de-DE" smtClean="0"/>
-              <a:t>27.11.2014</a:t>
+              <a:t>01.12.2014</a:t>
             </a:fld>
             <a:endParaRPr lang="de-DE"/>
           </a:p>
@@ -1782,7 +1786,7 @@
           <a:p>
             <a:fld id="{53456102-AF98-4902-8B3F-7190DD0573D9}" type="datetimeFigureOut">
               <a:rPr lang="de-DE" smtClean="0"/>
-              <a:t>27.11.2014</a:t>
+              <a:t>01.12.2014</a:t>
             </a:fld>
             <a:endParaRPr lang="de-DE"/>
           </a:p>
@@ -1900,7 +1904,7 @@
           <a:p>
             <a:fld id="{53456102-AF98-4902-8B3F-7190DD0573D9}" type="datetimeFigureOut">
               <a:rPr lang="de-DE" smtClean="0"/>
-              <a:t>27.11.2014</a:t>
+              <a:t>01.12.2014</a:t>
             </a:fld>
             <a:endParaRPr lang="de-DE"/>
           </a:p>
@@ -1995,7 +1999,7 @@
           <a:p>
             <a:fld id="{53456102-AF98-4902-8B3F-7190DD0573D9}" type="datetimeFigureOut">
               <a:rPr lang="de-DE" smtClean="0"/>
-              <a:t>27.11.2014</a:t>
+              <a:t>01.12.2014</a:t>
             </a:fld>
             <a:endParaRPr lang="de-DE"/>
           </a:p>
@@ -2272,7 +2276,7 @@
           <a:p>
             <a:fld id="{53456102-AF98-4902-8B3F-7190DD0573D9}" type="datetimeFigureOut">
               <a:rPr lang="de-DE" smtClean="0"/>
-              <a:t>27.11.2014</a:t>
+              <a:t>01.12.2014</a:t>
             </a:fld>
             <a:endParaRPr lang="de-DE"/>
           </a:p>
@@ -2525,7 +2529,7 @@
           <a:p>
             <a:fld id="{53456102-AF98-4902-8B3F-7190DD0573D9}" type="datetimeFigureOut">
               <a:rPr lang="de-DE" smtClean="0"/>
-              <a:t>27.11.2014</a:t>
+              <a:t>01.12.2014</a:t>
             </a:fld>
             <a:endParaRPr lang="de-DE"/>
           </a:p>
@@ -2738,7 +2742,7 @@
           <a:p>
             <a:fld id="{53456102-AF98-4902-8B3F-7190DD0573D9}" type="datetimeFigureOut">
               <a:rPr lang="de-DE" smtClean="0"/>
-              <a:t>27.11.2014</a:t>
+              <a:t>01.12.2014</a:t>
             </a:fld>
             <a:endParaRPr lang="de-DE"/>
           </a:p>
@@ -7135,6 +7139,1277 @@
   <p:clrMapOvr>
     <a:masterClrMapping/>
   </p:clrMapOvr>
+  <p:timing>
+    <p:tnLst>
+      <p:par>
+        <p:cTn id="1" dur="indefinite" restart="never" nodeType="tmRoot"/>
+      </p:par>
+    </p:tnLst>
+  </p:timing>
+</p:sld>
+</file>
+
+<file path=ppt/slides/slide4.xml><?xml version="1.0" encoding="utf-8"?>
+<p:sld xmlns:a="http://schemas.openxmlformats.org/drawingml/2006/main" xmlns:r="http://schemas.openxmlformats.org/officeDocument/2006/relationships" xmlns:p="http://schemas.openxmlformats.org/presentationml/2006/main">
+  <p:cSld>
+    <p:spTree>
+      <p:nvGrpSpPr>
+        <p:cNvPr id="1" name=""/>
+        <p:cNvGrpSpPr/>
+        <p:nvPr/>
+      </p:nvGrpSpPr>
+      <p:grpSpPr>
+        <a:xfrm>
+          <a:off x="0" y="0"/>
+          <a:ext cx="0" cy="0"/>
+          <a:chOff x="0" y="0"/>
+          <a:chExt cx="0" cy="0"/>
+        </a:xfrm>
+      </p:grpSpPr>
+      <p:sp>
+        <p:nvSpPr>
+          <p:cNvPr id="24" name="Rechteck 23"/>
+          <p:cNvSpPr/>
+          <p:nvPr/>
+        </p:nvSpPr>
+        <p:spPr>
+          <a:xfrm>
+            <a:off x="2123728" y="1820821"/>
+            <a:ext cx="864096" cy="384043"/>
+          </a:xfrm>
+          <a:prstGeom prst="rect">
+            <a:avLst/>
+          </a:prstGeom>
+          <a:solidFill>
+            <a:schemeClr val="bg1"/>
+          </a:solidFill>
+        </p:spPr>
+        <p:style>
+          <a:lnRef idx="2">
+            <a:schemeClr val="accent1">
+              <a:shade val="50000"/>
+            </a:schemeClr>
+          </a:lnRef>
+          <a:fillRef idx="1">
+            <a:schemeClr val="accent1"/>
+          </a:fillRef>
+          <a:effectRef idx="0">
+            <a:schemeClr val="accent1"/>
+          </a:effectRef>
+          <a:fontRef idx="minor">
+            <a:schemeClr val="lt1"/>
+          </a:fontRef>
+        </p:style>
+        <p:txBody>
+          <a:bodyPr rot="0" spcFirstLastPara="0" vertOverflow="overflow" horzOverflow="overflow" vert="horz" wrap="square" lIns="0" tIns="45720" rIns="0" bIns="45720" numCol="1" spcCol="0" rtlCol="0" fromWordArt="0" anchor="ctr" anchorCtr="0" forceAA="0" compatLnSpc="1">
+            <a:prstTxWarp prst="textNoShape">
+              <a:avLst/>
+            </a:prstTxWarp>
+            <a:noAutofit/>
+          </a:bodyPr>
+          <a:lstStyle/>
+          <a:p>
+            <a:pPr algn="ctr"/>
+            <a:r>
+              <a:rPr lang="de-DE" sz="1000" b="1" dirty="0" smtClean="0">
+                <a:solidFill>
+                  <a:schemeClr val="tx1"/>
+                </a:solidFill>
+              </a:rPr>
+              <a:t>Task A:</a:t>
+            </a:r>
+          </a:p>
+          <a:p>
+            <a:pPr algn="ctr"/>
+            <a:r>
+              <a:rPr lang="de-DE" sz="1000" b="1" dirty="0" smtClean="0">
+                <a:solidFill>
+                  <a:schemeClr val="tx1"/>
+                </a:solidFill>
+              </a:rPr>
+              <a:t>ENABLED</a:t>
+            </a:r>
+            <a:endParaRPr lang="de-DE" sz="1000" b="1" dirty="0">
+              <a:solidFill>
+                <a:schemeClr val="tx1"/>
+              </a:solidFill>
+            </a:endParaRPr>
+          </a:p>
+        </p:txBody>
+      </p:sp>
+      <p:sp>
+        <p:nvSpPr>
+          <p:cNvPr id="5" name="Rechteck 4"/>
+          <p:cNvSpPr/>
+          <p:nvPr/>
+        </p:nvSpPr>
+        <p:spPr>
+          <a:xfrm>
+            <a:off x="2699792" y="1196752"/>
+            <a:ext cx="864096" cy="384043"/>
+          </a:xfrm>
+          <a:prstGeom prst="rect">
+            <a:avLst/>
+          </a:prstGeom>
+          <a:solidFill>
+            <a:schemeClr val="bg1"/>
+          </a:solidFill>
+        </p:spPr>
+        <p:style>
+          <a:lnRef idx="2">
+            <a:schemeClr val="accent1">
+              <a:shade val="50000"/>
+            </a:schemeClr>
+          </a:lnRef>
+          <a:fillRef idx="1">
+            <a:schemeClr val="accent1"/>
+          </a:fillRef>
+          <a:effectRef idx="0">
+            <a:schemeClr val="accent1"/>
+          </a:effectRef>
+          <a:fontRef idx="minor">
+            <a:schemeClr val="lt1"/>
+          </a:fontRef>
+        </p:style>
+        <p:txBody>
+          <a:bodyPr rot="0" spcFirstLastPara="0" vertOverflow="overflow" horzOverflow="overflow" vert="horz" wrap="square" lIns="0" tIns="45720" rIns="0" bIns="45720" numCol="1" spcCol="0" rtlCol="0" fromWordArt="0" anchor="ctr" anchorCtr="0" forceAA="0" compatLnSpc="1">
+            <a:prstTxWarp prst="textNoShape">
+              <a:avLst/>
+            </a:prstTxWarp>
+            <a:noAutofit/>
+          </a:bodyPr>
+          <a:lstStyle/>
+          <a:p>
+            <a:pPr algn="ctr"/>
+            <a:r>
+              <a:rPr lang="de-DE" sz="1000" b="1" dirty="0" smtClean="0">
+                <a:solidFill>
+                  <a:schemeClr val="tx1"/>
+                </a:solidFill>
+              </a:rPr>
+              <a:t>Case Instance:</a:t>
+            </a:r>
+          </a:p>
+          <a:p>
+            <a:pPr algn="ctr"/>
+            <a:r>
+              <a:rPr lang="de-DE" sz="1000" b="1" dirty="0" smtClean="0">
+                <a:solidFill>
+                  <a:schemeClr val="tx1"/>
+                </a:solidFill>
+              </a:rPr>
+              <a:t>ACTIVE</a:t>
+            </a:r>
+            <a:endParaRPr lang="de-DE" sz="1000" b="1" dirty="0">
+              <a:solidFill>
+                <a:schemeClr val="tx1"/>
+              </a:solidFill>
+            </a:endParaRPr>
+          </a:p>
+        </p:txBody>
+      </p:sp>
+      <p:sp>
+        <p:nvSpPr>
+          <p:cNvPr id="7" name="Rechteck 6"/>
+          <p:cNvSpPr/>
+          <p:nvPr/>
+        </p:nvSpPr>
+        <p:spPr>
+          <a:xfrm>
+            <a:off x="3275856" y="1820821"/>
+            <a:ext cx="864096" cy="384043"/>
+          </a:xfrm>
+          <a:prstGeom prst="rect">
+            <a:avLst/>
+          </a:prstGeom>
+          <a:solidFill>
+            <a:schemeClr val="bg1"/>
+          </a:solidFill>
+        </p:spPr>
+        <p:style>
+          <a:lnRef idx="2">
+            <a:schemeClr val="accent1">
+              <a:shade val="50000"/>
+            </a:schemeClr>
+          </a:lnRef>
+          <a:fillRef idx="1">
+            <a:schemeClr val="accent1"/>
+          </a:fillRef>
+          <a:effectRef idx="0">
+            <a:schemeClr val="accent1"/>
+          </a:effectRef>
+          <a:fontRef idx="minor">
+            <a:schemeClr val="lt1"/>
+          </a:fontRef>
+        </p:style>
+        <p:txBody>
+          <a:bodyPr rot="0" spcFirstLastPara="0" vertOverflow="overflow" horzOverflow="overflow" vert="horz" wrap="square" lIns="0" tIns="45720" rIns="0" bIns="45720" numCol="1" spcCol="0" rtlCol="0" fromWordArt="0" anchor="ctr" anchorCtr="0" forceAA="0" compatLnSpc="1">
+            <a:prstTxWarp prst="textNoShape">
+              <a:avLst/>
+            </a:prstTxWarp>
+            <a:noAutofit/>
+          </a:bodyPr>
+          <a:lstStyle/>
+          <a:p>
+            <a:pPr algn="ctr"/>
+            <a:r>
+              <a:rPr lang="de-DE" sz="1000" b="1" dirty="0" smtClean="0">
+                <a:solidFill>
+                  <a:schemeClr val="tx1"/>
+                </a:solidFill>
+              </a:rPr>
+              <a:t>Task B:</a:t>
+            </a:r>
+          </a:p>
+          <a:p>
+            <a:pPr algn="ctr"/>
+            <a:r>
+              <a:rPr lang="de-DE" sz="1000" b="1" dirty="0" smtClean="0">
+                <a:solidFill>
+                  <a:schemeClr val="tx1"/>
+                </a:solidFill>
+              </a:rPr>
+              <a:t>AVAILABLE</a:t>
+            </a:r>
+            <a:endParaRPr lang="de-DE" sz="1000" b="1" dirty="0">
+              <a:solidFill>
+                <a:schemeClr val="tx1"/>
+              </a:solidFill>
+            </a:endParaRPr>
+          </a:p>
+        </p:txBody>
+      </p:sp>
+      <p:cxnSp>
+        <p:nvCxnSpPr>
+          <p:cNvPr id="9" name="Gerade Verbindung mit Pfeil 8"/>
+          <p:cNvCxnSpPr/>
+          <p:nvPr/>
+        </p:nvCxnSpPr>
+        <p:spPr>
+          <a:xfrm flipV="1">
+            <a:off x="2699792" y="1580795"/>
+            <a:ext cx="288032" cy="240026"/>
+          </a:xfrm>
+          <a:prstGeom prst="straightConnector1">
+            <a:avLst/>
+          </a:prstGeom>
+          <a:ln>
+            <a:tailEnd type="triangle"/>
+          </a:ln>
+        </p:spPr>
+        <p:style>
+          <a:lnRef idx="1">
+            <a:schemeClr val="accent1"/>
+          </a:lnRef>
+          <a:fillRef idx="0">
+            <a:schemeClr val="accent1"/>
+          </a:fillRef>
+          <a:effectRef idx="0">
+            <a:schemeClr val="accent1"/>
+          </a:effectRef>
+          <a:fontRef idx="minor">
+            <a:schemeClr val="tx1"/>
+          </a:fontRef>
+        </p:style>
+      </p:cxnSp>
+      <p:cxnSp>
+        <p:nvCxnSpPr>
+          <p:cNvPr id="11" name="Gerade Verbindung mit Pfeil 10"/>
+          <p:cNvCxnSpPr/>
+          <p:nvPr/>
+        </p:nvCxnSpPr>
+        <p:spPr>
+          <a:xfrm flipH="1" flipV="1">
+            <a:off x="3275856" y="1580795"/>
+            <a:ext cx="288032" cy="240026"/>
+          </a:xfrm>
+          <a:prstGeom prst="straightConnector1">
+            <a:avLst/>
+          </a:prstGeom>
+          <a:ln>
+            <a:tailEnd type="triangle"/>
+          </a:ln>
+        </p:spPr>
+        <p:style>
+          <a:lnRef idx="1">
+            <a:schemeClr val="accent1"/>
+          </a:lnRef>
+          <a:fillRef idx="0">
+            <a:schemeClr val="accent1"/>
+          </a:fillRef>
+          <a:effectRef idx="0">
+            <a:schemeClr val="accent1"/>
+          </a:effectRef>
+          <a:fontRef idx="minor">
+            <a:schemeClr val="tx1"/>
+          </a:fontRef>
+        </p:style>
+      </p:cxnSp>
+    </p:spTree>
+    <p:extLst>
+      <p:ext uri="{BB962C8B-B14F-4D97-AF65-F5344CB8AC3E}">
+        <p14:creationId xmlns:p14="http://schemas.microsoft.com/office/powerpoint/2010/main" val="706107221"/>
+      </p:ext>
+    </p:extLst>
+  </p:cSld>
+  <p:clrMapOvr>
+    <a:masterClrMapping/>
+  </p:clrMapOvr>
+  <p:timing>
+    <p:tnLst>
+      <p:par>
+        <p:cTn id="1" dur="indefinite" restart="never" nodeType="tmRoot"/>
+      </p:par>
+    </p:tnLst>
+  </p:timing>
+</p:sld>
+</file>
+
+<file path=ppt/slides/slide5.xml><?xml version="1.0" encoding="utf-8"?>
+<p:sld xmlns:a="http://schemas.openxmlformats.org/drawingml/2006/main" xmlns:r="http://schemas.openxmlformats.org/officeDocument/2006/relationships" xmlns:p="http://schemas.openxmlformats.org/presentationml/2006/main">
+  <p:cSld>
+    <p:spTree>
+      <p:nvGrpSpPr>
+        <p:cNvPr id="1" name=""/>
+        <p:cNvGrpSpPr/>
+        <p:nvPr/>
+      </p:nvGrpSpPr>
+      <p:grpSpPr>
+        <a:xfrm>
+          <a:off x="0" y="0"/>
+          <a:ext cx="0" cy="0"/>
+          <a:chOff x="0" y="0"/>
+          <a:chExt cx="0" cy="0"/>
+        </a:xfrm>
+      </p:grpSpPr>
+      <p:sp>
+        <p:nvSpPr>
+          <p:cNvPr id="15" name="Rechteck 14"/>
+          <p:cNvSpPr/>
+          <p:nvPr/>
+        </p:nvSpPr>
+        <p:spPr>
+          <a:xfrm>
+            <a:off x="2123728" y="1820821"/>
+            <a:ext cx="864096" cy="384043"/>
+          </a:xfrm>
+          <a:prstGeom prst="rect">
+            <a:avLst/>
+          </a:prstGeom>
+          <a:solidFill>
+            <a:schemeClr val="bg1"/>
+          </a:solidFill>
+        </p:spPr>
+        <p:style>
+          <a:lnRef idx="2">
+            <a:schemeClr val="accent1">
+              <a:shade val="50000"/>
+            </a:schemeClr>
+          </a:lnRef>
+          <a:fillRef idx="1">
+            <a:schemeClr val="accent1"/>
+          </a:fillRef>
+          <a:effectRef idx="0">
+            <a:schemeClr val="accent1"/>
+          </a:effectRef>
+          <a:fontRef idx="minor">
+            <a:schemeClr val="lt1"/>
+          </a:fontRef>
+        </p:style>
+        <p:txBody>
+          <a:bodyPr rot="0" spcFirstLastPara="0" vertOverflow="overflow" horzOverflow="overflow" vert="horz" wrap="square" lIns="0" tIns="45720" rIns="0" bIns="45720" numCol="1" spcCol="0" rtlCol="0" fromWordArt="0" anchor="ctr" anchorCtr="0" forceAA="0" compatLnSpc="1">
+            <a:prstTxWarp prst="textNoShape">
+              <a:avLst/>
+            </a:prstTxWarp>
+            <a:noAutofit/>
+          </a:bodyPr>
+          <a:lstStyle/>
+          <a:p>
+            <a:pPr algn="ctr"/>
+            <a:r>
+              <a:rPr lang="de-DE" sz="1000" b="1" dirty="0" smtClean="0">
+                <a:solidFill>
+                  <a:schemeClr val="tx1"/>
+                </a:solidFill>
+              </a:rPr>
+              <a:t>Task A:</a:t>
+            </a:r>
+          </a:p>
+          <a:p>
+            <a:pPr algn="ctr"/>
+            <a:r>
+              <a:rPr lang="de-DE" sz="1000" b="1" dirty="0" smtClean="0">
+                <a:solidFill>
+                  <a:schemeClr val="tx1"/>
+                </a:solidFill>
+              </a:rPr>
+              <a:t>ACTIVE</a:t>
+            </a:r>
+            <a:endParaRPr lang="de-DE" sz="1000" b="1" dirty="0">
+              <a:solidFill>
+                <a:schemeClr val="tx1"/>
+              </a:solidFill>
+            </a:endParaRPr>
+          </a:p>
+        </p:txBody>
+      </p:sp>
+      <p:sp>
+        <p:nvSpPr>
+          <p:cNvPr id="8" name="Rechteck 7"/>
+          <p:cNvSpPr/>
+          <p:nvPr/>
+        </p:nvSpPr>
+        <p:spPr>
+          <a:xfrm>
+            <a:off x="2699792" y="1196752"/>
+            <a:ext cx="864096" cy="384043"/>
+          </a:xfrm>
+          <a:prstGeom prst="rect">
+            <a:avLst/>
+          </a:prstGeom>
+          <a:solidFill>
+            <a:schemeClr val="bg1"/>
+          </a:solidFill>
+        </p:spPr>
+        <p:style>
+          <a:lnRef idx="2">
+            <a:schemeClr val="accent1">
+              <a:shade val="50000"/>
+            </a:schemeClr>
+          </a:lnRef>
+          <a:fillRef idx="1">
+            <a:schemeClr val="accent1"/>
+          </a:fillRef>
+          <a:effectRef idx="0">
+            <a:schemeClr val="accent1"/>
+          </a:effectRef>
+          <a:fontRef idx="minor">
+            <a:schemeClr val="lt1"/>
+          </a:fontRef>
+        </p:style>
+        <p:txBody>
+          <a:bodyPr rot="0" spcFirstLastPara="0" vertOverflow="overflow" horzOverflow="overflow" vert="horz" wrap="square" lIns="0" tIns="45720" rIns="0" bIns="45720" numCol="1" spcCol="0" rtlCol="0" fromWordArt="0" anchor="ctr" anchorCtr="0" forceAA="0" compatLnSpc="1">
+            <a:prstTxWarp prst="textNoShape">
+              <a:avLst/>
+            </a:prstTxWarp>
+            <a:noAutofit/>
+          </a:bodyPr>
+          <a:lstStyle/>
+          <a:p>
+            <a:pPr algn="ctr"/>
+            <a:r>
+              <a:rPr lang="de-DE" sz="1000" b="1" dirty="0" smtClean="0">
+                <a:solidFill>
+                  <a:schemeClr val="tx1"/>
+                </a:solidFill>
+              </a:rPr>
+              <a:t>Case Instance:</a:t>
+            </a:r>
+          </a:p>
+          <a:p>
+            <a:pPr algn="ctr"/>
+            <a:r>
+              <a:rPr lang="de-DE" sz="1000" b="1" dirty="0" smtClean="0">
+                <a:solidFill>
+                  <a:schemeClr val="tx1"/>
+                </a:solidFill>
+              </a:rPr>
+              <a:t>ACTIVE</a:t>
+            </a:r>
+            <a:endParaRPr lang="de-DE" sz="1000" b="1" dirty="0">
+              <a:solidFill>
+                <a:schemeClr val="tx1"/>
+              </a:solidFill>
+            </a:endParaRPr>
+          </a:p>
+        </p:txBody>
+      </p:sp>
+      <p:sp>
+        <p:nvSpPr>
+          <p:cNvPr id="12" name="Rechteck 11"/>
+          <p:cNvSpPr/>
+          <p:nvPr/>
+        </p:nvSpPr>
+        <p:spPr>
+          <a:xfrm>
+            <a:off x="3275856" y="1820821"/>
+            <a:ext cx="864096" cy="384043"/>
+          </a:xfrm>
+          <a:prstGeom prst="rect">
+            <a:avLst/>
+          </a:prstGeom>
+          <a:solidFill>
+            <a:schemeClr val="bg1"/>
+          </a:solidFill>
+        </p:spPr>
+        <p:style>
+          <a:lnRef idx="2">
+            <a:schemeClr val="accent1">
+              <a:shade val="50000"/>
+            </a:schemeClr>
+          </a:lnRef>
+          <a:fillRef idx="1">
+            <a:schemeClr val="accent1"/>
+          </a:fillRef>
+          <a:effectRef idx="0">
+            <a:schemeClr val="accent1"/>
+          </a:effectRef>
+          <a:fontRef idx="minor">
+            <a:schemeClr val="lt1"/>
+          </a:fontRef>
+        </p:style>
+        <p:txBody>
+          <a:bodyPr rot="0" spcFirstLastPara="0" vertOverflow="overflow" horzOverflow="overflow" vert="horz" wrap="square" lIns="0" tIns="45720" rIns="0" bIns="45720" numCol="1" spcCol="0" rtlCol="0" fromWordArt="0" anchor="ctr" anchorCtr="0" forceAA="0" compatLnSpc="1">
+            <a:prstTxWarp prst="textNoShape">
+              <a:avLst/>
+            </a:prstTxWarp>
+            <a:noAutofit/>
+          </a:bodyPr>
+          <a:lstStyle/>
+          <a:p>
+            <a:pPr algn="ctr"/>
+            <a:r>
+              <a:rPr lang="de-DE" sz="1000" b="1" dirty="0" smtClean="0">
+                <a:solidFill>
+                  <a:schemeClr val="tx1"/>
+                </a:solidFill>
+              </a:rPr>
+              <a:t>Task B:</a:t>
+            </a:r>
+          </a:p>
+          <a:p>
+            <a:pPr algn="ctr"/>
+            <a:r>
+              <a:rPr lang="de-DE" sz="1000" b="1" dirty="0" smtClean="0">
+                <a:solidFill>
+                  <a:schemeClr val="tx1"/>
+                </a:solidFill>
+              </a:rPr>
+              <a:t>AVAILABLE</a:t>
+            </a:r>
+            <a:endParaRPr lang="de-DE" sz="1000" b="1" dirty="0">
+              <a:solidFill>
+                <a:schemeClr val="tx1"/>
+              </a:solidFill>
+            </a:endParaRPr>
+          </a:p>
+        </p:txBody>
+      </p:sp>
+      <p:cxnSp>
+        <p:nvCxnSpPr>
+          <p:cNvPr id="13" name="Gerade Verbindung mit Pfeil 12"/>
+          <p:cNvCxnSpPr/>
+          <p:nvPr/>
+        </p:nvCxnSpPr>
+        <p:spPr>
+          <a:xfrm flipV="1">
+            <a:off x="2699792" y="1580795"/>
+            <a:ext cx="288032" cy="240026"/>
+          </a:xfrm>
+          <a:prstGeom prst="straightConnector1">
+            <a:avLst/>
+          </a:prstGeom>
+          <a:ln>
+            <a:tailEnd type="triangle"/>
+          </a:ln>
+        </p:spPr>
+        <p:style>
+          <a:lnRef idx="1">
+            <a:schemeClr val="accent1"/>
+          </a:lnRef>
+          <a:fillRef idx="0">
+            <a:schemeClr val="accent1"/>
+          </a:fillRef>
+          <a:effectRef idx="0">
+            <a:schemeClr val="accent1"/>
+          </a:effectRef>
+          <a:fontRef idx="minor">
+            <a:schemeClr val="tx1"/>
+          </a:fontRef>
+        </p:style>
+      </p:cxnSp>
+      <p:cxnSp>
+        <p:nvCxnSpPr>
+          <p:cNvPr id="14" name="Gerade Verbindung mit Pfeil 13"/>
+          <p:cNvCxnSpPr/>
+          <p:nvPr/>
+        </p:nvCxnSpPr>
+        <p:spPr>
+          <a:xfrm flipH="1" flipV="1">
+            <a:off x="3275856" y="1580795"/>
+            <a:ext cx="288032" cy="240026"/>
+          </a:xfrm>
+          <a:prstGeom prst="straightConnector1">
+            <a:avLst/>
+          </a:prstGeom>
+          <a:ln>
+            <a:tailEnd type="triangle"/>
+          </a:ln>
+        </p:spPr>
+        <p:style>
+          <a:lnRef idx="1">
+            <a:schemeClr val="accent1"/>
+          </a:lnRef>
+          <a:fillRef idx="0">
+            <a:schemeClr val="accent1"/>
+          </a:fillRef>
+          <a:effectRef idx="0">
+            <a:schemeClr val="accent1"/>
+          </a:effectRef>
+          <a:fontRef idx="minor">
+            <a:schemeClr val="tx1"/>
+          </a:fontRef>
+        </p:style>
+      </p:cxnSp>
+    </p:spTree>
+    <p:extLst>
+      <p:ext uri="{BB962C8B-B14F-4D97-AF65-F5344CB8AC3E}">
+        <p14:creationId xmlns:p14="http://schemas.microsoft.com/office/powerpoint/2010/main" val="906761421"/>
+      </p:ext>
+    </p:extLst>
+  </p:cSld>
+  <p:clrMapOvr>
+    <a:masterClrMapping/>
+  </p:clrMapOvr>
+  <p:timing>
+    <p:tnLst>
+      <p:par>
+        <p:cTn id="1" dur="indefinite" restart="never" nodeType="tmRoot"/>
+      </p:par>
+    </p:tnLst>
+  </p:timing>
+</p:sld>
+</file>
+
+<file path=ppt/slides/slide6.xml><?xml version="1.0" encoding="utf-8"?>
+<p:sld xmlns:a="http://schemas.openxmlformats.org/drawingml/2006/main" xmlns:r="http://schemas.openxmlformats.org/officeDocument/2006/relationships" xmlns:p="http://schemas.openxmlformats.org/presentationml/2006/main">
+  <p:cSld>
+    <p:spTree>
+      <p:nvGrpSpPr>
+        <p:cNvPr id="1" name=""/>
+        <p:cNvGrpSpPr/>
+        <p:nvPr/>
+      </p:nvGrpSpPr>
+      <p:grpSpPr>
+        <a:xfrm>
+          <a:off x="0" y="0"/>
+          <a:ext cx="0" cy="0"/>
+          <a:chOff x="0" y="0"/>
+          <a:chExt cx="0" cy="0"/>
+        </a:xfrm>
+      </p:grpSpPr>
+      <p:sp>
+        <p:nvSpPr>
+          <p:cNvPr id="15" name="Rechteck 14"/>
+          <p:cNvSpPr/>
+          <p:nvPr/>
+        </p:nvSpPr>
+        <p:spPr>
+          <a:xfrm>
+            <a:off x="2123728" y="1820821"/>
+            <a:ext cx="864096" cy="384043"/>
+          </a:xfrm>
+          <a:prstGeom prst="rect">
+            <a:avLst/>
+          </a:prstGeom>
+          <a:solidFill>
+            <a:schemeClr val="bg1"/>
+          </a:solidFill>
+        </p:spPr>
+        <p:style>
+          <a:lnRef idx="2">
+            <a:schemeClr val="accent1">
+              <a:shade val="50000"/>
+            </a:schemeClr>
+          </a:lnRef>
+          <a:fillRef idx="1">
+            <a:schemeClr val="accent1"/>
+          </a:fillRef>
+          <a:effectRef idx="0">
+            <a:schemeClr val="accent1"/>
+          </a:effectRef>
+          <a:fontRef idx="minor">
+            <a:schemeClr val="lt1"/>
+          </a:fontRef>
+        </p:style>
+        <p:txBody>
+          <a:bodyPr rot="0" spcFirstLastPara="0" vertOverflow="overflow" horzOverflow="overflow" vert="horz" wrap="square" lIns="0" tIns="45720" rIns="0" bIns="45720" numCol="1" spcCol="0" rtlCol="0" fromWordArt="0" anchor="ctr" anchorCtr="0" forceAA="0" compatLnSpc="1">
+            <a:prstTxWarp prst="textNoShape">
+              <a:avLst/>
+            </a:prstTxWarp>
+            <a:noAutofit/>
+          </a:bodyPr>
+          <a:lstStyle/>
+          <a:p>
+            <a:pPr algn="ctr"/>
+            <a:r>
+              <a:rPr lang="de-DE" sz="1000" b="1" dirty="0" smtClean="0">
+                <a:solidFill>
+                  <a:schemeClr val="tx1"/>
+                </a:solidFill>
+              </a:rPr>
+              <a:t>Task A:</a:t>
+            </a:r>
+          </a:p>
+          <a:p>
+            <a:pPr algn="ctr"/>
+            <a:r>
+              <a:rPr lang="de-DE" sz="1000" b="1" dirty="0" smtClean="0">
+                <a:solidFill>
+                  <a:schemeClr val="tx1"/>
+                </a:solidFill>
+              </a:rPr>
+              <a:t>COMPLETED</a:t>
+            </a:r>
+            <a:endParaRPr lang="de-DE" sz="1000" b="1" dirty="0">
+              <a:solidFill>
+                <a:schemeClr val="tx1"/>
+              </a:solidFill>
+            </a:endParaRPr>
+          </a:p>
+        </p:txBody>
+      </p:sp>
+      <p:sp>
+        <p:nvSpPr>
+          <p:cNvPr id="8" name="Rechteck 7"/>
+          <p:cNvSpPr/>
+          <p:nvPr/>
+        </p:nvSpPr>
+        <p:spPr>
+          <a:xfrm>
+            <a:off x="2699792" y="1196752"/>
+            <a:ext cx="864096" cy="384043"/>
+          </a:xfrm>
+          <a:prstGeom prst="rect">
+            <a:avLst/>
+          </a:prstGeom>
+          <a:solidFill>
+            <a:schemeClr val="bg1"/>
+          </a:solidFill>
+        </p:spPr>
+        <p:style>
+          <a:lnRef idx="2">
+            <a:schemeClr val="accent1">
+              <a:shade val="50000"/>
+            </a:schemeClr>
+          </a:lnRef>
+          <a:fillRef idx="1">
+            <a:schemeClr val="accent1"/>
+          </a:fillRef>
+          <a:effectRef idx="0">
+            <a:schemeClr val="accent1"/>
+          </a:effectRef>
+          <a:fontRef idx="minor">
+            <a:schemeClr val="lt1"/>
+          </a:fontRef>
+        </p:style>
+        <p:txBody>
+          <a:bodyPr rot="0" spcFirstLastPara="0" vertOverflow="overflow" horzOverflow="overflow" vert="horz" wrap="square" lIns="0" tIns="45720" rIns="0" bIns="45720" numCol="1" spcCol="0" rtlCol="0" fromWordArt="0" anchor="ctr" anchorCtr="0" forceAA="0" compatLnSpc="1">
+            <a:prstTxWarp prst="textNoShape">
+              <a:avLst/>
+            </a:prstTxWarp>
+            <a:noAutofit/>
+          </a:bodyPr>
+          <a:lstStyle/>
+          <a:p>
+            <a:pPr algn="ctr"/>
+            <a:r>
+              <a:rPr lang="de-DE" sz="1000" b="1" dirty="0" smtClean="0">
+                <a:solidFill>
+                  <a:schemeClr val="tx1"/>
+                </a:solidFill>
+              </a:rPr>
+              <a:t>Case Instance:</a:t>
+            </a:r>
+          </a:p>
+          <a:p>
+            <a:pPr algn="ctr"/>
+            <a:r>
+              <a:rPr lang="de-DE" sz="1000" b="1" dirty="0" smtClean="0">
+                <a:solidFill>
+                  <a:schemeClr val="tx1"/>
+                </a:solidFill>
+              </a:rPr>
+              <a:t>ACTIVE</a:t>
+            </a:r>
+            <a:endParaRPr lang="de-DE" sz="1000" b="1" dirty="0">
+              <a:solidFill>
+                <a:schemeClr val="tx1"/>
+              </a:solidFill>
+            </a:endParaRPr>
+          </a:p>
+        </p:txBody>
+      </p:sp>
+      <p:sp>
+        <p:nvSpPr>
+          <p:cNvPr id="12" name="Rechteck 11"/>
+          <p:cNvSpPr/>
+          <p:nvPr/>
+        </p:nvSpPr>
+        <p:spPr>
+          <a:xfrm>
+            <a:off x="3275856" y="1820821"/>
+            <a:ext cx="864096" cy="384043"/>
+          </a:xfrm>
+          <a:prstGeom prst="rect">
+            <a:avLst/>
+          </a:prstGeom>
+          <a:solidFill>
+            <a:schemeClr val="bg1"/>
+          </a:solidFill>
+        </p:spPr>
+        <p:style>
+          <a:lnRef idx="2">
+            <a:schemeClr val="accent1">
+              <a:shade val="50000"/>
+            </a:schemeClr>
+          </a:lnRef>
+          <a:fillRef idx="1">
+            <a:schemeClr val="accent1"/>
+          </a:fillRef>
+          <a:effectRef idx="0">
+            <a:schemeClr val="accent1"/>
+          </a:effectRef>
+          <a:fontRef idx="minor">
+            <a:schemeClr val="lt1"/>
+          </a:fontRef>
+        </p:style>
+        <p:txBody>
+          <a:bodyPr rot="0" spcFirstLastPara="0" vertOverflow="overflow" horzOverflow="overflow" vert="horz" wrap="square" lIns="0" tIns="45720" rIns="0" bIns="45720" numCol="1" spcCol="0" rtlCol="0" fromWordArt="0" anchor="ctr" anchorCtr="0" forceAA="0" compatLnSpc="1">
+            <a:prstTxWarp prst="textNoShape">
+              <a:avLst/>
+            </a:prstTxWarp>
+            <a:noAutofit/>
+          </a:bodyPr>
+          <a:lstStyle/>
+          <a:p>
+            <a:pPr algn="ctr"/>
+            <a:r>
+              <a:rPr lang="de-DE" sz="1000" b="1" dirty="0" smtClean="0">
+                <a:solidFill>
+                  <a:schemeClr val="tx1"/>
+                </a:solidFill>
+              </a:rPr>
+              <a:t>Task B:</a:t>
+            </a:r>
+          </a:p>
+          <a:p>
+            <a:pPr algn="ctr"/>
+            <a:r>
+              <a:rPr lang="de-DE" sz="1000" b="1" dirty="0" smtClean="0">
+                <a:solidFill>
+                  <a:schemeClr val="tx1"/>
+                </a:solidFill>
+              </a:rPr>
+              <a:t>ENABLED</a:t>
+            </a:r>
+            <a:endParaRPr lang="de-DE" sz="1000" b="1" dirty="0">
+              <a:solidFill>
+                <a:schemeClr val="tx1"/>
+              </a:solidFill>
+            </a:endParaRPr>
+          </a:p>
+        </p:txBody>
+      </p:sp>
+      <p:cxnSp>
+        <p:nvCxnSpPr>
+          <p:cNvPr id="13" name="Gerade Verbindung mit Pfeil 12"/>
+          <p:cNvCxnSpPr/>
+          <p:nvPr/>
+        </p:nvCxnSpPr>
+        <p:spPr>
+          <a:xfrm flipV="1">
+            <a:off x="2699792" y="1580795"/>
+            <a:ext cx="288032" cy="240026"/>
+          </a:xfrm>
+          <a:prstGeom prst="straightConnector1">
+            <a:avLst/>
+          </a:prstGeom>
+          <a:ln>
+            <a:tailEnd type="triangle"/>
+          </a:ln>
+        </p:spPr>
+        <p:style>
+          <a:lnRef idx="1">
+            <a:schemeClr val="accent1"/>
+          </a:lnRef>
+          <a:fillRef idx="0">
+            <a:schemeClr val="accent1"/>
+          </a:fillRef>
+          <a:effectRef idx="0">
+            <a:schemeClr val="accent1"/>
+          </a:effectRef>
+          <a:fontRef idx="minor">
+            <a:schemeClr val="tx1"/>
+          </a:fontRef>
+        </p:style>
+      </p:cxnSp>
+      <p:cxnSp>
+        <p:nvCxnSpPr>
+          <p:cNvPr id="14" name="Gerade Verbindung mit Pfeil 13"/>
+          <p:cNvCxnSpPr/>
+          <p:nvPr/>
+        </p:nvCxnSpPr>
+        <p:spPr>
+          <a:xfrm flipH="1" flipV="1">
+            <a:off x="3275856" y="1580795"/>
+            <a:ext cx="288032" cy="240026"/>
+          </a:xfrm>
+          <a:prstGeom prst="straightConnector1">
+            <a:avLst/>
+          </a:prstGeom>
+          <a:ln>
+            <a:tailEnd type="triangle"/>
+          </a:ln>
+        </p:spPr>
+        <p:style>
+          <a:lnRef idx="1">
+            <a:schemeClr val="accent1"/>
+          </a:lnRef>
+          <a:fillRef idx="0">
+            <a:schemeClr val="accent1"/>
+          </a:fillRef>
+          <a:effectRef idx="0">
+            <a:schemeClr val="accent1"/>
+          </a:effectRef>
+          <a:fontRef idx="minor">
+            <a:schemeClr val="tx1"/>
+          </a:fontRef>
+        </p:style>
+      </p:cxnSp>
+    </p:spTree>
+    <p:extLst>
+      <p:ext uri="{BB962C8B-B14F-4D97-AF65-F5344CB8AC3E}">
+        <p14:creationId xmlns:p14="http://schemas.microsoft.com/office/powerpoint/2010/main" val="372766194"/>
+      </p:ext>
+    </p:extLst>
+  </p:cSld>
+  <p:clrMapOvr>
+    <a:masterClrMapping/>
+  </p:clrMapOvr>
+  <p:timing>
+    <p:tnLst>
+      <p:par>
+        <p:cTn id="1" dur="indefinite" restart="never" nodeType="tmRoot"/>
+      </p:par>
+    </p:tnLst>
+  </p:timing>
+</p:sld>
+</file>
+
+<file path=ppt/slides/slide7.xml><?xml version="1.0" encoding="utf-8"?>
+<p:sld xmlns:a="http://schemas.openxmlformats.org/drawingml/2006/main" xmlns:r="http://schemas.openxmlformats.org/officeDocument/2006/relationships" xmlns:p="http://schemas.openxmlformats.org/presentationml/2006/main">
+  <p:cSld>
+    <p:spTree>
+      <p:nvGrpSpPr>
+        <p:cNvPr id="1" name=""/>
+        <p:cNvGrpSpPr/>
+        <p:nvPr/>
+      </p:nvGrpSpPr>
+      <p:grpSpPr>
+        <a:xfrm>
+          <a:off x="0" y="0"/>
+          <a:ext cx="0" cy="0"/>
+          <a:chOff x="0" y="0"/>
+          <a:chExt cx="0" cy="0"/>
+        </a:xfrm>
+      </p:grpSpPr>
+      <p:sp>
+        <p:nvSpPr>
+          <p:cNvPr id="15" name="Rechteck 14"/>
+          <p:cNvSpPr/>
+          <p:nvPr/>
+        </p:nvSpPr>
+        <p:spPr>
+          <a:xfrm>
+            <a:off x="2123728" y="1820821"/>
+            <a:ext cx="864096" cy="384043"/>
+          </a:xfrm>
+          <a:prstGeom prst="rect">
+            <a:avLst/>
+          </a:prstGeom>
+          <a:solidFill>
+            <a:schemeClr val="bg1"/>
+          </a:solidFill>
+        </p:spPr>
+        <p:style>
+          <a:lnRef idx="2">
+            <a:schemeClr val="accent1">
+              <a:shade val="50000"/>
+            </a:schemeClr>
+          </a:lnRef>
+          <a:fillRef idx="1">
+            <a:schemeClr val="accent1"/>
+          </a:fillRef>
+          <a:effectRef idx="0">
+            <a:schemeClr val="accent1"/>
+          </a:effectRef>
+          <a:fontRef idx="minor">
+            <a:schemeClr val="lt1"/>
+          </a:fontRef>
+        </p:style>
+        <p:txBody>
+          <a:bodyPr rot="0" spcFirstLastPara="0" vertOverflow="overflow" horzOverflow="overflow" vert="horz" wrap="square" lIns="0" tIns="45720" rIns="0" bIns="45720" numCol="1" spcCol="0" rtlCol="0" fromWordArt="0" anchor="ctr" anchorCtr="0" forceAA="0" compatLnSpc="1">
+            <a:prstTxWarp prst="textNoShape">
+              <a:avLst/>
+            </a:prstTxWarp>
+            <a:noAutofit/>
+          </a:bodyPr>
+          <a:lstStyle/>
+          <a:p>
+            <a:pPr algn="ctr"/>
+            <a:r>
+              <a:rPr lang="de-DE" sz="1000" b="1" dirty="0" smtClean="0">
+                <a:solidFill>
+                  <a:schemeClr val="tx1"/>
+                </a:solidFill>
+              </a:rPr>
+              <a:t>Task A:</a:t>
+            </a:r>
+          </a:p>
+          <a:p>
+            <a:pPr algn="ctr"/>
+            <a:r>
+              <a:rPr lang="de-DE" sz="1000" b="1" dirty="0" smtClean="0">
+                <a:solidFill>
+                  <a:schemeClr val="tx1"/>
+                </a:solidFill>
+              </a:rPr>
+              <a:t>COMPLETED</a:t>
+            </a:r>
+            <a:endParaRPr lang="de-DE" sz="1000" b="1" dirty="0">
+              <a:solidFill>
+                <a:schemeClr val="tx1"/>
+              </a:solidFill>
+            </a:endParaRPr>
+          </a:p>
+        </p:txBody>
+      </p:sp>
+      <p:sp>
+        <p:nvSpPr>
+          <p:cNvPr id="8" name="Rechteck 7"/>
+          <p:cNvSpPr/>
+          <p:nvPr/>
+        </p:nvSpPr>
+        <p:spPr>
+          <a:xfrm>
+            <a:off x="2699792" y="1196752"/>
+            <a:ext cx="864096" cy="384043"/>
+          </a:xfrm>
+          <a:prstGeom prst="rect">
+            <a:avLst/>
+          </a:prstGeom>
+          <a:solidFill>
+            <a:schemeClr val="bg1"/>
+          </a:solidFill>
+        </p:spPr>
+        <p:style>
+          <a:lnRef idx="2">
+            <a:schemeClr val="accent1">
+              <a:shade val="50000"/>
+            </a:schemeClr>
+          </a:lnRef>
+          <a:fillRef idx="1">
+            <a:schemeClr val="accent1"/>
+          </a:fillRef>
+          <a:effectRef idx="0">
+            <a:schemeClr val="accent1"/>
+          </a:effectRef>
+          <a:fontRef idx="minor">
+            <a:schemeClr val="lt1"/>
+          </a:fontRef>
+        </p:style>
+        <p:txBody>
+          <a:bodyPr rot="0" spcFirstLastPara="0" vertOverflow="overflow" horzOverflow="overflow" vert="horz" wrap="square" lIns="0" tIns="45720" rIns="0" bIns="45720" numCol="1" spcCol="0" rtlCol="0" fromWordArt="0" anchor="ctr" anchorCtr="0" forceAA="0" compatLnSpc="1">
+            <a:prstTxWarp prst="textNoShape">
+              <a:avLst/>
+            </a:prstTxWarp>
+            <a:noAutofit/>
+          </a:bodyPr>
+          <a:lstStyle/>
+          <a:p>
+            <a:pPr algn="ctr"/>
+            <a:r>
+              <a:rPr lang="de-DE" sz="1000" b="1" dirty="0" smtClean="0">
+                <a:solidFill>
+                  <a:schemeClr val="tx1"/>
+                </a:solidFill>
+              </a:rPr>
+              <a:t>Case Instance:</a:t>
+            </a:r>
+          </a:p>
+          <a:p>
+            <a:pPr algn="ctr"/>
+            <a:r>
+              <a:rPr lang="de-DE" sz="1000" b="1" dirty="0" smtClean="0">
+                <a:solidFill>
+                  <a:schemeClr val="tx1"/>
+                </a:solidFill>
+              </a:rPr>
+              <a:t>COMPLETED</a:t>
+            </a:r>
+            <a:endParaRPr lang="de-DE" sz="1000" b="1" dirty="0">
+              <a:solidFill>
+                <a:schemeClr val="tx1"/>
+              </a:solidFill>
+            </a:endParaRPr>
+          </a:p>
+        </p:txBody>
+      </p:sp>
+      <p:sp>
+        <p:nvSpPr>
+          <p:cNvPr id="12" name="Rechteck 11"/>
+          <p:cNvSpPr/>
+          <p:nvPr/>
+        </p:nvSpPr>
+        <p:spPr>
+          <a:xfrm>
+            <a:off x="3275856" y="1820821"/>
+            <a:ext cx="864096" cy="384043"/>
+          </a:xfrm>
+          <a:prstGeom prst="rect">
+            <a:avLst/>
+          </a:prstGeom>
+          <a:solidFill>
+            <a:schemeClr val="bg1"/>
+          </a:solidFill>
+        </p:spPr>
+        <p:style>
+          <a:lnRef idx="2">
+            <a:schemeClr val="accent1">
+              <a:shade val="50000"/>
+            </a:schemeClr>
+          </a:lnRef>
+          <a:fillRef idx="1">
+            <a:schemeClr val="accent1"/>
+          </a:fillRef>
+          <a:effectRef idx="0">
+            <a:schemeClr val="accent1"/>
+          </a:effectRef>
+          <a:fontRef idx="minor">
+            <a:schemeClr val="lt1"/>
+          </a:fontRef>
+        </p:style>
+        <p:txBody>
+          <a:bodyPr rot="0" spcFirstLastPara="0" vertOverflow="overflow" horzOverflow="overflow" vert="horz" wrap="square" lIns="0" tIns="45720" rIns="0" bIns="45720" numCol="1" spcCol="0" rtlCol="0" fromWordArt="0" anchor="ctr" anchorCtr="0" forceAA="0" compatLnSpc="1">
+            <a:prstTxWarp prst="textNoShape">
+              <a:avLst/>
+            </a:prstTxWarp>
+            <a:noAutofit/>
+          </a:bodyPr>
+          <a:lstStyle/>
+          <a:p>
+            <a:pPr algn="ctr"/>
+            <a:r>
+              <a:rPr lang="de-DE" sz="1000" b="1" dirty="0" smtClean="0">
+                <a:solidFill>
+                  <a:schemeClr val="tx1"/>
+                </a:solidFill>
+              </a:rPr>
+              <a:t>Task B:</a:t>
+            </a:r>
+          </a:p>
+          <a:p>
+            <a:pPr algn="ctr"/>
+            <a:r>
+              <a:rPr lang="de-DE" sz="1000" b="1" dirty="0" smtClean="0">
+                <a:solidFill>
+                  <a:schemeClr val="tx1"/>
+                </a:solidFill>
+              </a:rPr>
+              <a:t>COMPLETED</a:t>
+            </a:r>
+            <a:endParaRPr lang="de-DE" sz="1000" b="1" dirty="0">
+              <a:solidFill>
+                <a:schemeClr val="tx1"/>
+              </a:solidFill>
+            </a:endParaRPr>
+          </a:p>
+        </p:txBody>
+      </p:sp>
+      <p:cxnSp>
+        <p:nvCxnSpPr>
+          <p:cNvPr id="13" name="Gerade Verbindung mit Pfeil 12"/>
+          <p:cNvCxnSpPr/>
+          <p:nvPr/>
+        </p:nvCxnSpPr>
+        <p:spPr>
+          <a:xfrm flipV="1">
+            <a:off x="2699792" y="1580795"/>
+            <a:ext cx="288032" cy="240026"/>
+          </a:xfrm>
+          <a:prstGeom prst="straightConnector1">
+            <a:avLst/>
+          </a:prstGeom>
+          <a:ln>
+            <a:tailEnd type="triangle"/>
+          </a:ln>
+        </p:spPr>
+        <p:style>
+          <a:lnRef idx="1">
+            <a:schemeClr val="accent1"/>
+          </a:lnRef>
+          <a:fillRef idx="0">
+            <a:schemeClr val="accent1"/>
+          </a:fillRef>
+          <a:effectRef idx="0">
+            <a:schemeClr val="accent1"/>
+          </a:effectRef>
+          <a:fontRef idx="minor">
+            <a:schemeClr val="tx1"/>
+          </a:fontRef>
+        </p:style>
+      </p:cxnSp>
+      <p:cxnSp>
+        <p:nvCxnSpPr>
+          <p:cNvPr id="14" name="Gerade Verbindung mit Pfeil 13"/>
+          <p:cNvCxnSpPr/>
+          <p:nvPr/>
+        </p:nvCxnSpPr>
+        <p:spPr>
+          <a:xfrm flipH="1" flipV="1">
+            <a:off x="3275856" y="1580795"/>
+            <a:ext cx="288032" cy="240026"/>
+          </a:xfrm>
+          <a:prstGeom prst="straightConnector1">
+            <a:avLst/>
+          </a:prstGeom>
+          <a:ln>
+            <a:tailEnd type="triangle"/>
+          </a:ln>
+        </p:spPr>
+        <p:style>
+          <a:lnRef idx="1">
+            <a:schemeClr val="accent1"/>
+          </a:lnRef>
+          <a:fillRef idx="0">
+            <a:schemeClr val="accent1"/>
+          </a:fillRef>
+          <a:effectRef idx="0">
+            <a:schemeClr val="accent1"/>
+          </a:effectRef>
+          <a:fontRef idx="minor">
+            <a:schemeClr val="tx1"/>
+          </a:fontRef>
+        </p:style>
+      </p:cxnSp>
+    </p:spTree>
+    <p:extLst>
+      <p:ext uri="{BB962C8B-B14F-4D97-AF65-F5344CB8AC3E}">
+        <p14:creationId xmlns:p14="http://schemas.microsoft.com/office/powerpoint/2010/main" val="3078619987"/>
+      </p:ext>
+    </p:extLst>
+  </p:cSld>
+  <p:clrMapOvr>
+    <a:masterClrMapping/>
+  </p:clrMapOvr>
+  <p:timing>
+    <p:tnLst>
+      <p:par>
+        <p:cTn id="1" dur="indefinite" restart="never" nodeType="tmRoot"/>
+      </p:par>
+    </p:tnLst>
+  </p:timing>
 </p:sld>
 </file>
 

</xml_diff>

<commit_message>
feat(cmmn): add manual activation rule
related to CAM-3169
</commit_message>
<xml_diff>
--- a/develop/drawings/CaseLifeCycles.pptx
+++ b/develop/drawings/CaseLifeCycles.pptx
@@ -310,7 +310,7 @@
           <a:p>
             <a:fld id="{53456102-AF98-4902-8B3F-7190DD0573D9}" type="datetimeFigureOut">
               <a:rPr lang="de-DE" smtClean="0"/>
-              <a:t>01.12.2014</a:t>
+              <a:t>03.12.2014</a:t>
             </a:fld>
             <a:endParaRPr lang="de-DE"/>
           </a:p>
@@ -480,7 +480,7 @@
           <a:p>
             <a:fld id="{53456102-AF98-4902-8B3F-7190DD0573D9}" type="datetimeFigureOut">
               <a:rPr lang="de-DE" smtClean="0"/>
-              <a:t>01.12.2014</a:t>
+              <a:t>03.12.2014</a:t>
             </a:fld>
             <a:endParaRPr lang="de-DE"/>
           </a:p>
@@ -660,7 +660,7 @@
           <a:p>
             <a:fld id="{53456102-AF98-4902-8B3F-7190DD0573D9}" type="datetimeFigureOut">
               <a:rPr lang="de-DE" smtClean="0"/>
-              <a:t>01.12.2014</a:t>
+              <a:t>03.12.2014</a:t>
             </a:fld>
             <a:endParaRPr lang="de-DE"/>
           </a:p>
@@ -830,7 +830,7 @@
           <a:p>
             <a:fld id="{53456102-AF98-4902-8B3F-7190DD0573D9}" type="datetimeFigureOut">
               <a:rPr lang="de-DE" smtClean="0"/>
-              <a:t>01.12.2014</a:t>
+              <a:t>03.12.2014</a:t>
             </a:fld>
             <a:endParaRPr lang="de-DE"/>
           </a:p>
@@ -1076,7 +1076,7 @@
           <a:p>
             <a:fld id="{53456102-AF98-4902-8B3F-7190DD0573D9}" type="datetimeFigureOut">
               <a:rPr lang="de-DE" smtClean="0"/>
-              <a:t>01.12.2014</a:t>
+              <a:t>03.12.2014</a:t>
             </a:fld>
             <a:endParaRPr lang="de-DE"/>
           </a:p>
@@ -1364,7 +1364,7 @@
           <a:p>
             <a:fld id="{53456102-AF98-4902-8B3F-7190DD0573D9}" type="datetimeFigureOut">
               <a:rPr lang="de-DE" smtClean="0"/>
-              <a:t>01.12.2014</a:t>
+              <a:t>03.12.2014</a:t>
             </a:fld>
             <a:endParaRPr lang="de-DE"/>
           </a:p>
@@ -1786,7 +1786,7 @@
           <a:p>
             <a:fld id="{53456102-AF98-4902-8B3F-7190DD0573D9}" type="datetimeFigureOut">
               <a:rPr lang="de-DE" smtClean="0"/>
-              <a:t>01.12.2014</a:t>
+              <a:t>03.12.2014</a:t>
             </a:fld>
             <a:endParaRPr lang="de-DE"/>
           </a:p>
@@ -1904,7 +1904,7 @@
           <a:p>
             <a:fld id="{53456102-AF98-4902-8B3F-7190DD0573D9}" type="datetimeFigureOut">
               <a:rPr lang="de-DE" smtClean="0"/>
-              <a:t>01.12.2014</a:t>
+              <a:t>03.12.2014</a:t>
             </a:fld>
             <a:endParaRPr lang="de-DE"/>
           </a:p>
@@ -1999,7 +1999,7 @@
           <a:p>
             <a:fld id="{53456102-AF98-4902-8B3F-7190DD0573D9}" type="datetimeFigureOut">
               <a:rPr lang="de-DE" smtClean="0"/>
-              <a:t>01.12.2014</a:t>
+              <a:t>03.12.2014</a:t>
             </a:fld>
             <a:endParaRPr lang="de-DE"/>
           </a:p>
@@ -2276,7 +2276,7 @@
           <a:p>
             <a:fld id="{53456102-AF98-4902-8B3F-7190DD0573D9}" type="datetimeFigureOut">
               <a:rPr lang="de-DE" smtClean="0"/>
-              <a:t>01.12.2014</a:t>
+              <a:t>03.12.2014</a:t>
             </a:fld>
             <a:endParaRPr lang="de-DE"/>
           </a:p>
@@ -2529,7 +2529,7 @@
           <a:p>
             <a:fld id="{53456102-AF98-4902-8B3F-7190DD0573D9}" type="datetimeFigureOut">
               <a:rPr lang="de-DE" smtClean="0"/>
-              <a:t>01.12.2014</a:t>
+              <a:t>03.12.2014</a:t>
             </a:fld>
             <a:endParaRPr lang="de-DE"/>
           </a:p>
@@ -2742,7 +2742,7 @@
           <a:p>
             <a:fld id="{53456102-AF98-4902-8B3F-7190DD0573D9}" type="datetimeFigureOut">
               <a:rPr lang="de-DE" smtClean="0"/>
-              <a:t>01.12.2014</a:t>
+              <a:t>03.12.2014</a:t>
             </a:fld>
             <a:endParaRPr lang="de-DE"/>
           </a:p>
@@ -4603,9 +4603,7 @@
           </a:prstGeom>
           <a:ln w="12700">
             <a:solidFill>
-              <a:schemeClr val="bg1">
-                <a:lumMod val="65000"/>
-              </a:schemeClr>
+              <a:schemeClr val="tx1"/>
             </a:solidFill>
             <a:headEnd type="arrow" w="med" len="med"/>
             <a:tailEnd type="none" w="med" len="med"/>
@@ -5061,13 +5059,7 @@
               <a:defRPr lang="de-DE"/>
             </a:defPPr>
             <a:lvl1pPr>
-              <a:defRPr sz="1200">
-                <a:solidFill>
-                  <a:schemeClr val="bg1">
-                    <a:lumMod val="50000"/>
-                  </a:schemeClr>
-                </a:solidFill>
-              </a:defRPr>
+              <a:defRPr sz="1200"/>
             </a:lvl1pPr>
           </a:lstStyle>
           <a:p>

</xml_diff>